<commit_message>
Updated after discussion in the chairs sync call
</commit_message>
<xml_diff>
--- a/122/nmop-chairs-slides-session-1.pptx
+++ b/122/nmop-chairs-slides-session-1.pptx
@@ -6,7 +6,7 @@
     <p:sldMasterId id="2147483665" r:id="rId2"/>
   </p:sldMasterIdLst>
   <p:notesMasterIdLst>
-    <p:notesMasterId r:id="rId13"/>
+    <p:notesMasterId r:id="rId14"/>
   </p:notesMasterIdLst>
   <p:sldIdLst>
     <p:sldId id="276" r:id="rId3"/>
@@ -18,7 +18,8 @@
     <p:sldId id="269" r:id="rId9"/>
     <p:sldId id="268" r:id="rId10"/>
     <p:sldId id="277" r:id="rId11"/>
-    <p:sldId id="273" r:id="rId12"/>
+    <p:sldId id="278" r:id="rId12"/>
+    <p:sldId id="273" r:id="rId13"/>
   </p:sldIdLst>
   <p:sldSz cx="9144000" cy="5143500" type="screen16x9"/>
   <p:notesSz cx="6858000" cy="9144000"/>
@@ -354,7 +355,7 @@
   <pc:docChgLst>
     <pc:chgData name="BOUCADAIR Mohamed INNOV/NET" userId="2acbca90-6db1-4111-98c4-832797dda751" providerId="ADAL" clId="{E6BEDC53-1058-40DF-84A9-01050C2EB903}"/>
     <pc:docChg chg="undo custSel addSld delSld modSld">
-      <pc:chgData name="BOUCADAIR Mohamed INNOV/NET" userId="2acbca90-6db1-4111-98c4-832797dda751" providerId="ADAL" clId="{E6BEDC53-1058-40DF-84A9-01050C2EB903}" dt="2025-03-10T08:46:48.944" v="1293" actId="114"/>
+      <pc:chgData name="BOUCADAIR Mohamed INNOV/NET" userId="2acbca90-6db1-4111-98c4-832797dda751" providerId="ADAL" clId="{E6BEDC53-1058-40DF-84A9-01050C2EB903}" dt="2025-03-10T09:07:25.282" v="1937" actId="20577"/>
       <pc:docMkLst>
         <pc:docMk/>
       </pc:docMkLst>
@@ -404,13 +405,13 @@
         </pc:picChg>
       </pc:sldChg>
       <pc:sldChg chg="addSp delSp modSp mod">
-        <pc:chgData name="BOUCADAIR Mohamed INNOV/NET" userId="2acbca90-6db1-4111-98c4-832797dda751" providerId="ADAL" clId="{E6BEDC53-1058-40DF-84A9-01050C2EB903}" dt="2025-03-07T14:10:07.021" v="470" actId="14100"/>
+        <pc:chgData name="BOUCADAIR Mohamed INNOV/NET" userId="2acbca90-6db1-4111-98c4-832797dda751" providerId="ADAL" clId="{E6BEDC53-1058-40DF-84A9-01050C2EB903}" dt="2025-03-10T09:02:13.590" v="1533" actId="6549"/>
         <pc:sldMkLst>
           <pc:docMk/>
           <pc:sldMk cId="2749868532" sldId="268"/>
         </pc:sldMkLst>
         <pc:spChg chg="mod">
-          <ac:chgData name="BOUCADAIR Mohamed INNOV/NET" userId="2acbca90-6db1-4111-98c4-832797dda751" providerId="ADAL" clId="{E6BEDC53-1058-40DF-84A9-01050C2EB903}" dt="2025-03-07T14:05:49.926" v="185" actId="1076"/>
+          <ac:chgData name="BOUCADAIR Mohamed INNOV/NET" userId="2acbca90-6db1-4111-98c4-832797dda751" providerId="ADAL" clId="{E6BEDC53-1058-40DF-84A9-01050C2EB903}" dt="2025-03-10T09:02:13.590" v="1533" actId="6549"/>
           <ac:spMkLst>
             <pc:docMk/>
             <pc:sldMk cId="2749868532" sldId="268"/>
@@ -687,6 +688,29 @@
             <pc:docMk/>
             <pc:sldMk cId="1761515331" sldId="278"/>
             <ac:spMk id="3" creationId="{46F4F189-4D20-5E2F-9724-832916C523C5}"/>
+          </ac:spMkLst>
+        </pc:spChg>
+      </pc:sldChg>
+      <pc:sldChg chg="modSp new mod">
+        <pc:chgData name="BOUCADAIR Mohamed INNOV/NET" userId="2acbca90-6db1-4111-98c4-832797dda751" providerId="ADAL" clId="{E6BEDC53-1058-40DF-84A9-01050C2EB903}" dt="2025-03-10T09:07:25.282" v="1937" actId="20577"/>
+        <pc:sldMkLst>
+          <pc:docMk/>
+          <pc:sldMk cId="3126002501" sldId="278"/>
+        </pc:sldMkLst>
+        <pc:spChg chg="mod">
+          <ac:chgData name="BOUCADAIR Mohamed INNOV/NET" userId="2acbca90-6db1-4111-98c4-832797dda751" providerId="ADAL" clId="{E6BEDC53-1058-40DF-84A9-01050C2EB903}" dt="2025-03-10T09:02:02.257" v="1523" actId="20577"/>
+          <ac:spMkLst>
+            <pc:docMk/>
+            <pc:sldMk cId="3126002501" sldId="278"/>
+            <ac:spMk id="2" creationId="{8CB80A68-339E-59CB-D366-225D6BB54F09}"/>
+          </ac:spMkLst>
+        </pc:spChg>
+        <pc:spChg chg="mod">
+          <ac:chgData name="BOUCADAIR Mohamed INNOV/NET" userId="2acbca90-6db1-4111-98c4-832797dda751" providerId="ADAL" clId="{E6BEDC53-1058-40DF-84A9-01050C2EB903}" dt="2025-03-10T09:07:25.282" v="1937" actId="20577"/>
+          <ac:spMkLst>
+            <pc:docMk/>
+            <pc:sldMk cId="3126002501" sldId="278"/>
+            <ac:spMk id="3" creationId="{861806AB-9EE7-F510-E36C-729E0A024320}"/>
           </ac:spMkLst>
         </pc:spChg>
       </pc:sldChg>
@@ -17915,6 +17939,221 @@
           <p:cNvPr id="2" name="Titre 1">
             <a:extLst>
               <a:ext uri="{FF2B5EF4-FFF2-40B4-BE49-F238E27FC236}">
+                <a16:creationId xmlns:a16="http://schemas.microsoft.com/office/drawing/2014/main" id="{8CB80A68-339E-59CB-D366-225D6BB54F09}"/>
+              </a:ext>
+            </a:extLst>
+          </p:cNvPr>
+          <p:cNvSpPr>
+            <a:spLocks noGrp="1"/>
+          </p:cNvSpPr>
+          <p:nvPr>
+            <p:ph type="title"/>
+          </p:nvPr>
+        </p:nvSpPr>
+        <p:spPr/>
+        <p:txBody>
+          <a:bodyPr/>
+          <a:lstStyle/>
+          <a:p>
+            <a:r>
+              <a:rPr lang="fr-FR" dirty="0" err="1"/>
+              <a:t>Cooperation</a:t>
+            </a:r>
+            <a:r>
+              <a:rPr lang="fr-FR" dirty="0"/>
+              <a:t> </a:t>
+            </a:r>
+            <a:r>
+              <a:rPr lang="fr-FR" dirty="0" err="1"/>
+              <a:t>with</a:t>
+            </a:r>
+            <a:r>
+              <a:rPr lang="fr-FR" dirty="0"/>
+              <a:t> </a:t>
+            </a:r>
+            <a:r>
+              <a:rPr lang="fr-FR" dirty="0" err="1"/>
+              <a:t>SDOs</a:t>
+            </a:r>
+            <a:endParaRPr lang="fr-FR" dirty="0"/>
+          </a:p>
+        </p:txBody>
+      </p:sp>
+      <p:sp>
+        <p:nvSpPr>
+          <p:cNvPr id="3" name="Espace réservé du texte 2">
+            <a:extLst>
+              <a:ext uri="{FF2B5EF4-FFF2-40B4-BE49-F238E27FC236}">
+                <a16:creationId xmlns:a16="http://schemas.microsoft.com/office/drawing/2014/main" id="{861806AB-9EE7-F510-E36C-729E0A024320}"/>
+              </a:ext>
+            </a:extLst>
+          </p:cNvPr>
+          <p:cNvSpPr>
+            <a:spLocks noGrp="1"/>
+          </p:cNvSpPr>
+          <p:nvPr>
+            <p:ph type="body" idx="1"/>
+          </p:nvPr>
+        </p:nvSpPr>
+        <p:spPr/>
+        <p:txBody>
+          <a:bodyPr/>
+          <a:lstStyle/>
+          <a:p>
+            <a:r>
+              <a:rPr lang="fr-FR" dirty="0"/>
+              <a:t>SIMAP</a:t>
+            </a:r>
+          </a:p>
+          <a:p>
+            <a:pPr lvl="1"/>
+            <a:r>
+              <a:rPr lang="fr-FR" b="1" dirty="0"/>
+              <a:t>IWON</a:t>
+            </a:r>
+            <a:r>
+              <a:rPr lang="fr-FR" dirty="0"/>
+              <a:t>: Follow-up to the meeting (Benoît)</a:t>
+            </a:r>
+          </a:p>
+          <a:p>
+            <a:pPr lvl="1"/>
+            <a:r>
+              <a:rPr lang="fr-FR" b="1" dirty="0"/>
+              <a:t>3GPP</a:t>
+            </a:r>
+            <a:r>
+              <a:rPr lang="fr-FR" dirty="0"/>
+              <a:t>: Link to the </a:t>
+            </a:r>
+            <a:r>
+              <a:rPr lang="fr-FR" dirty="0" err="1"/>
+              <a:t>ongoing</a:t>
+            </a:r>
+            <a:r>
+              <a:rPr lang="fr-FR" dirty="0"/>
+              <a:t> "Network </a:t>
+            </a:r>
+            <a:r>
+              <a:rPr lang="fr-FR" dirty="0" err="1"/>
+              <a:t>Topology</a:t>
+            </a:r>
+            <a:r>
+              <a:rPr lang="fr-FR" dirty="0"/>
+              <a:t> Data" in the 3GPP </a:t>
+            </a:r>
+            <a:r>
+              <a:rPr lang="fr-FR"/>
+              <a:t>SA5 (Med)</a:t>
+            </a:r>
+            <a:endParaRPr lang="fr-FR" dirty="0"/>
+          </a:p>
+          <a:p>
+            <a:pPr lvl="1"/>
+            <a:r>
+              <a:rPr lang="fr-FR" b="1" dirty="0"/>
+              <a:t>ETSI</a:t>
+            </a:r>
+            <a:r>
+              <a:rPr lang="fr-FR" dirty="0"/>
+              <a:t>:  TC Data (Diego)</a:t>
+            </a:r>
+          </a:p>
+          <a:p>
+            <a:endParaRPr lang="fr-FR" dirty="0"/>
+          </a:p>
+          <a:p>
+            <a:r>
+              <a:rPr lang="fr-FR" dirty="0"/>
+              <a:t>Message Broker</a:t>
+            </a:r>
+          </a:p>
+          <a:p>
+            <a:pPr lvl="1"/>
+            <a:r>
+              <a:rPr lang="fr-FR" b="1" dirty="0"/>
+              <a:t>BBF</a:t>
+            </a:r>
+            <a:r>
+              <a:rPr lang="fr-FR" dirty="0"/>
+              <a:t>: Thomas to report on the BBF Spring meeting</a:t>
+            </a:r>
+          </a:p>
+        </p:txBody>
+      </p:sp>
+      <p:sp>
+        <p:nvSpPr>
+          <p:cNvPr id="4" name="Espace réservé du numéro de diapositive 3">
+            <a:extLst>
+              <a:ext uri="{FF2B5EF4-FFF2-40B4-BE49-F238E27FC236}">
+                <a16:creationId xmlns:a16="http://schemas.microsoft.com/office/drawing/2014/main" id="{FB6194F4-5D70-380F-8BD3-1E0B28B8CF15}"/>
+              </a:ext>
+            </a:extLst>
+          </p:cNvPr>
+          <p:cNvSpPr>
+            <a:spLocks noGrp="1"/>
+          </p:cNvSpPr>
+          <p:nvPr>
+            <p:ph type="sldNum" idx="12"/>
+          </p:nvPr>
+        </p:nvSpPr>
+        <p:spPr/>
+        <p:txBody>
+          <a:bodyPr/>
+          <a:lstStyle/>
+          <a:p>
+            <a:pPr marL="0" lvl="0" indent="0" algn="r" rtl="0">
+              <a:spcBef>
+                <a:spcPts val="0"/>
+              </a:spcBef>
+              <a:spcAft>
+                <a:spcPts val="0"/>
+              </a:spcAft>
+              <a:buNone/>
+            </a:pPr>
+            <a:fld id="{00000000-1234-1234-1234-123412341234}" type="slidenum">
+              <a:rPr lang="en-US" smtClean="0"/>
+              <a:t>10</a:t>
+            </a:fld>
+            <a:endParaRPr lang="en-US"/>
+          </a:p>
+        </p:txBody>
+      </p:sp>
+    </p:spTree>
+    <p:extLst>
+      <p:ext uri="{BB962C8B-B14F-4D97-AF65-F5344CB8AC3E}">
+        <p14:creationId xmlns:p14="http://schemas.microsoft.com/office/powerpoint/2010/main" val="3126002501"/>
+      </p:ext>
+    </p:extLst>
+  </p:cSld>
+  <p:clrMapOvr>
+    <a:masterClrMapping/>
+  </p:clrMapOvr>
+</p:sld>
+</file>
+
+<file path=ppt/slides/slide11.xml><?xml version="1.0" encoding="utf-8"?>
+<p:sld xmlns:a="http://schemas.openxmlformats.org/drawingml/2006/main" xmlns:r="http://schemas.openxmlformats.org/officeDocument/2006/relationships" xmlns:p="http://schemas.openxmlformats.org/presentationml/2006/main">
+  <p:cSld>
+    <p:spTree>
+      <p:nvGrpSpPr>
+        <p:cNvPr id="1" name=""/>
+        <p:cNvGrpSpPr/>
+        <p:nvPr/>
+      </p:nvGrpSpPr>
+      <p:grpSpPr>
+        <a:xfrm>
+          <a:off x="0" y="0"/>
+          <a:ext cx="0" cy="0"/>
+          <a:chOff x="0" y="0"/>
+          <a:chExt cx="0" cy="0"/>
+        </a:xfrm>
+      </p:grpSpPr>
+      <p:sp>
+        <p:nvSpPr>
+          <p:cNvPr id="2" name="Titre 1">
+            <a:extLst>
+              <a:ext uri="{FF2B5EF4-FFF2-40B4-BE49-F238E27FC236}">
                 <a16:creationId xmlns:a16="http://schemas.microsoft.com/office/drawing/2014/main" id="{5B1C3519-5735-807D-95E4-47250F1A0CD3}"/>
               </a:ext>
             </a:extLst>
@@ -18018,7 +18257,7 @@
             </a:pPr>
             <a:fld id="{00000000-1234-1234-1234-123412341234}" type="slidenum">
               <a:rPr lang="en-US" smtClean="0"/>
-              <a:t>10</a:t>
+              <a:t>11</a:t>
             </a:fld>
             <a:endParaRPr lang="en-US"/>
           </a:p>
@@ -18901,7 +19140,7 @@
         <p:fade/>
       </p:transition>
     </mc:Choice>
-    <mc:Fallback xmlns="" xmlns:mv="urn:schemas-microsoft-com:mac:vml" xmlns:c="http://schemas.openxmlformats.org/drawingml/2006/chart" xmlns:dgm="http://schemas.openxmlformats.org/drawingml/2006/diagram" xmlns:o="urn:schemas-microsoft-com:office:office" xmlns:v="urn:schemas-microsoft-com:vml" xmlns:pvml="urn:schemas-microsoft-com:office:powerpoint" xmlns:com="http://schemas.openxmlformats.org/drawingml/2006/compatibility" xmlns:p15="http://schemas.microsoft.com/office/powerpoint/2012/main" xmlns:ahyp="http://schemas.microsoft.com/office/drawing/2018/hyperlinkcolor">
+    <mc:Fallback xmlns:ahyp="http://schemas.microsoft.com/office/drawing/2018/hyperlinkcolor" xmlns:p15="http://schemas.microsoft.com/office/powerpoint/2012/main" xmlns:com="http://schemas.openxmlformats.org/drawingml/2006/compatibility" xmlns:pvml="urn:schemas-microsoft-com:office:powerpoint" xmlns:v="urn:schemas-microsoft-com:vml" xmlns:o="urn:schemas-microsoft-com:office:office" xmlns:dgm="http://schemas.openxmlformats.org/drawingml/2006/diagram" xmlns:c="http://schemas.openxmlformats.org/drawingml/2006/chart" xmlns:mv="urn:schemas-microsoft-com:mac:vml" xmlns="">
       <p:transition spd="slow">
         <p:fade/>
       </p:transition>
@@ -19236,7 +19475,7 @@
         <p:fade/>
       </p:transition>
     </mc:Choice>
-    <mc:Fallback xmlns="" xmlns:mv="urn:schemas-microsoft-com:mac:vml" xmlns:c="http://schemas.openxmlformats.org/drawingml/2006/chart" xmlns:dgm="http://schemas.openxmlformats.org/drawingml/2006/diagram" xmlns:o="urn:schemas-microsoft-com:office:office" xmlns:v="urn:schemas-microsoft-com:vml" xmlns:pvml="urn:schemas-microsoft-com:office:powerpoint" xmlns:com="http://schemas.openxmlformats.org/drawingml/2006/compatibility" xmlns:p15="http://schemas.microsoft.com/office/powerpoint/2012/main" xmlns:ahyp="http://schemas.microsoft.com/office/drawing/2018/hyperlinkcolor">
+    <mc:Fallback xmlns:ahyp="http://schemas.microsoft.com/office/drawing/2018/hyperlinkcolor" xmlns:p15="http://schemas.microsoft.com/office/powerpoint/2012/main" xmlns:com="http://schemas.openxmlformats.org/drawingml/2006/compatibility" xmlns:pvml="urn:schemas-microsoft-com:office:powerpoint" xmlns:v="urn:schemas-microsoft-com:vml" xmlns:o="urn:schemas-microsoft-com:office:office" xmlns:dgm="http://schemas.openxmlformats.org/drawingml/2006/diagram" xmlns:c="http://schemas.openxmlformats.org/drawingml/2006/chart" xmlns:mv="urn:schemas-microsoft-com:mac:vml" xmlns="">
       <p:transition spd="slow">
         <p:fade/>
       </p:transition>
@@ -20563,7 +20802,7 @@
         </p:nvSpPr>
         <p:spPr>
           <a:xfrm>
-            <a:off x="982112" y="4738534"/>
+            <a:off x="982112" y="4463188"/>
             <a:ext cx="7711888" cy="307777"/>
           </a:xfrm>
           <a:custGeom>

</xml_diff>